<commit_message>
Processed figure 3 images but it is useless since the figure 2 and figure 3 were re run again
</commit_message>
<xml_diff>
--- a/figure2/ppt/figure2-pdf.pptx
+++ b/figure2/ppt/figure2-pdf.pptx
@@ -5513,7 +5513,7 @@
           <p:spPr>
             <a:xfrm>
               <a:off x="-3714750" y="6093296"/>
-              <a:ext cx="8229600" cy="5486400"/>
+              <a:ext cx="8229600" cy="5486399"/>
             </a:xfrm>
             <a:prstGeom prst="rect">
               <a:avLst/>
@@ -6220,7 +6220,7 @@
                     <a:srgbClr val="FF0000"/>
                   </a:solidFill>
                 </a:rPr>
-                <a:t>MDD=18.3</a:t>
+                <a:t>MDD=18.6</a:t>
               </a:r>
               <a:r>
                 <a:rPr lang="el-GR" altLang="zh-CN" sz="2600" dirty="0" smtClean="0">

</xml_diff>

<commit_message>
Finished figure 3 and deleted repeated images
</commit_message>
<xml_diff>
--- a/figure2/ppt/figure2-pdf.pptx
+++ b/figure2/ppt/figure2-pdf.pptx
@@ -5513,7 +5513,7 @@
           <p:spPr>
             <a:xfrm>
               <a:off x="-3714750" y="6093296"/>
-              <a:ext cx="8229600" cy="5486399"/>
+              <a:ext cx="8229599" cy="5486399"/>
             </a:xfrm>
             <a:prstGeom prst="rect">
               <a:avLst/>
@@ -5543,7 +5543,7 @@
           <p:spPr>
             <a:xfrm>
               <a:off x="3414713" y="6093296"/>
-              <a:ext cx="7315214" cy="5486411"/>
+              <a:ext cx="7315214" cy="5486410"/>
             </a:xfrm>
             <a:prstGeom prst="rect">
               <a:avLst/>

</xml_diff>

<commit_message>
Added slides for all the figures. Modified some slides.
</commit_message>
<xml_diff>
--- a/figure2/ppt/figure2-pdf.pptx
+++ b/figure2/ppt/figure2-pdf.pptx
@@ -3991,7 +3991,15 @@
               <a:pPr algn="ctr" eaLnBrk="1" hangingPunct="1"/>
               <a:r>
                 <a:rPr lang="en-US" altLang="zh-CN" sz="2600" b="1" dirty="0"/>
-                <a:t>(a) DSI-11 Ex Vivo</a:t>
+                <a:t>(a) </a:t>
+              </a:r>
+              <a:r>
+                <a:rPr lang="en-US" altLang="zh-CN" sz="2600" b="1" dirty="0" smtClean="0"/>
+                <a:t>DSI-11 Ex </a:t>
+              </a:r>
+              <a:r>
+                <a:rPr lang="en-US" altLang="zh-CN" sz="2600" b="1" dirty="0"/>
+                <a:t>Vivo</a:t>
               </a:r>
               <a:endParaRPr lang="zh-CN" altLang="en-US" sz="2600" b="1" dirty="0"/>
             </a:p>
@@ -5709,7 +5717,7 @@
               </a:r>
               <a:r>
                 <a:rPr lang="en-US" altLang="zh-CN" sz="2600" b="1" dirty="0" smtClean="0"/>
-                <a:t>DSI-11 b10k </a:t>
+                <a:t>DSI-11-b10k </a:t>
               </a:r>
               <a:r>
                 <a:rPr lang="en-US" altLang="zh-CN" sz="2600" b="1" dirty="0"/>
@@ -6046,12 +6054,12 @@
                 <a:t>(c) </a:t>
               </a:r>
               <a:r>
-                <a:rPr lang="en-US" altLang="zh-CN" sz="2600" b="1" dirty="0"/>
-                <a:t>DSI-11 </a:t>
+                <a:rPr lang="en-US" altLang="zh-CN" sz="2600" b="1" dirty="0" smtClean="0"/>
+                <a:t>DSI-11-b7k </a:t>
               </a:r>
               <a:r>
                 <a:rPr lang="en-US" altLang="zh-CN" sz="2600" b="1" dirty="0" smtClean="0"/>
-                <a:t>b7k In </a:t>
+                <a:t>In </a:t>
               </a:r>
               <a:r>
                 <a:rPr lang="en-US" altLang="zh-CN" sz="2600" b="1" dirty="0"/>

</xml_diff>